<commit_message>
update to have universal data and parameters for each model type and include base models
</commit_message>
<xml_diff>
--- a/Docs/Spatial_Sablefish_Methods_Results.pptx
+++ b/Docs/Spatial_Sablefish_Methods_Results.pptx
@@ -205,7 +205,7 @@
           <a:p>
             <a:fld id="{00AAFEE8-3C9A-1D4E-A360-50A3F658751C}" type="datetimeFigureOut">
               <a:rPr lang="en-US" smtClean="0"/>
-              <a:t>8/29/24</a:t>
+              <a:t>8/30/24</a:t>
             </a:fld>
             <a:endParaRPr lang="en-US"/>
           </a:p>
@@ -1543,7 +1543,7 @@
           <a:p>
             <a:fld id="{0005108C-1A64-8843-829B-17355C18E746}" type="datetimeFigureOut">
               <a:rPr lang="en-US" smtClean="0"/>
-              <a:t>8/29/24</a:t>
+              <a:t>8/30/24</a:t>
             </a:fld>
             <a:endParaRPr lang="en-US"/>
           </a:p>
@@ -1741,7 +1741,7 @@
           <a:p>
             <a:fld id="{0005108C-1A64-8843-829B-17355C18E746}" type="datetimeFigureOut">
               <a:rPr lang="en-US" smtClean="0"/>
-              <a:t>8/29/24</a:t>
+              <a:t>8/30/24</a:t>
             </a:fld>
             <a:endParaRPr lang="en-US"/>
           </a:p>
@@ -1949,7 +1949,7 @@
           <a:p>
             <a:fld id="{0005108C-1A64-8843-829B-17355C18E746}" type="datetimeFigureOut">
               <a:rPr lang="en-US" smtClean="0"/>
-              <a:t>8/29/24</a:t>
+              <a:t>8/30/24</a:t>
             </a:fld>
             <a:endParaRPr lang="en-US"/>
           </a:p>
@@ -2147,7 +2147,7 @@
           <a:p>
             <a:fld id="{0005108C-1A64-8843-829B-17355C18E746}" type="datetimeFigureOut">
               <a:rPr lang="en-US" smtClean="0"/>
-              <a:t>8/29/24</a:t>
+              <a:t>8/30/24</a:t>
             </a:fld>
             <a:endParaRPr lang="en-US"/>
           </a:p>
@@ -2422,7 +2422,7 @@
           <a:p>
             <a:fld id="{0005108C-1A64-8843-829B-17355C18E746}" type="datetimeFigureOut">
               <a:rPr lang="en-US" smtClean="0"/>
-              <a:t>8/29/24</a:t>
+              <a:t>8/30/24</a:t>
             </a:fld>
             <a:endParaRPr lang="en-US"/>
           </a:p>
@@ -2687,7 +2687,7 @@
           <a:p>
             <a:fld id="{0005108C-1A64-8843-829B-17355C18E746}" type="datetimeFigureOut">
               <a:rPr lang="en-US" smtClean="0"/>
-              <a:t>8/29/24</a:t>
+              <a:t>8/30/24</a:t>
             </a:fld>
             <a:endParaRPr lang="en-US"/>
           </a:p>
@@ -3099,7 +3099,7 @@
           <a:p>
             <a:fld id="{0005108C-1A64-8843-829B-17355C18E746}" type="datetimeFigureOut">
               <a:rPr lang="en-US" smtClean="0"/>
-              <a:t>8/29/24</a:t>
+              <a:t>8/30/24</a:t>
             </a:fld>
             <a:endParaRPr lang="en-US"/>
           </a:p>
@@ -3240,7 +3240,7 @@
           <a:p>
             <a:fld id="{0005108C-1A64-8843-829B-17355C18E746}" type="datetimeFigureOut">
               <a:rPr lang="en-US" smtClean="0"/>
-              <a:t>8/29/24</a:t>
+              <a:t>8/30/24</a:t>
             </a:fld>
             <a:endParaRPr lang="en-US"/>
           </a:p>
@@ -3353,7 +3353,7 @@
           <a:p>
             <a:fld id="{0005108C-1A64-8843-829B-17355C18E746}" type="datetimeFigureOut">
               <a:rPr lang="en-US" smtClean="0"/>
-              <a:t>8/29/24</a:t>
+              <a:t>8/30/24</a:t>
             </a:fld>
             <a:endParaRPr lang="en-US"/>
           </a:p>
@@ -3664,7 +3664,7 @@
           <a:p>
             <a:fld id="{0005108C-1A64-8843-829B-17355C18E746}" type="datetimeFigureOut">
               <a:rPr lang="en-US" smtClean="0"/>
-              <a:t>8/29/24</a:t>
+              <a:t>8/30/24</a:t>
             </a:fld>
             <a:endParaRPr lang="en-US"/>
           </a:p>
@@ -3952,7 +3952,7 @@
           <a:p>
             <a:fld id="{0005108C-1A64-8843-829B-17355C18E746}" type="datetimeFigureOut">
               <a:rPr lang="en-US" smtClean="0"/>
-              <a:t>8/29/24</a:t>
+              <a:t>8/30/24</a:t>
             </a:fld>
             <a:endParaRPr lang="en-US"/>
           </a:p>
@@ -4193,7 +4193,7 @@
           <a:p>
             <a:fld id="{0005108C-1A64-8843-829B-17355C18E746}" type="datetimeFigureOut">
               <a:rPr lang="en-US" smtClean="0"/>
-              <a:t>8/29/24</a:t>
+              <a:t>8/30/24</a:t>
             </a:fld>
             <a:endParaRPr lang="en-US"/>
           </a:p>
@@ -14062,14 +14062,14 @@
           <p:nvPr>
             <p:extLst>
               <p:ext uri="{D42A27DB-BD31-4B8C-83A1-F6EECF244321}">
-                <p14:modId xmlns:p14="http://schemas.microsoft.com/office/powerpoint/2010/main" val="4047452021"/>
+                <p14:modId xmlns:p14="http://schemas.microsoft.com/office/powerpoint/2010/main" val="2587640405"/>
               </p:ext>
             </p:extLst>
           </p:nvPr>
         </p:nvGraphicFramePr>
         <p:xfrm>
           <a:off x="87086" y="0"/>
-          <a:ext cx="11643359" cy="6666026"/>
+          <a:ext cx="11643359" cy="7560636"/>
         </p:xfrm>
         <a:graphic>
           <a:graphicData uri="http://schemas.openxmlformats.org/drawingml/2006/table">
@@ -14294,7 +14294,15 @@
                       </a:r>
                       <a:r>
                         <a:rPr lang="en-US" sz="1300" dirty="0"/>
-                        <a:t>, regional R0 (sum to zero)</a:t>
+                        <a:t>, regional R0 (sum to zero) with first 10 and last 3 </a:t>
+                      </a:r>
+                      <a:r>
+                        <a:rPr lang="en-US" sz="1300" dirty="0" err="1"/>
+                        <a:t>devs</a:t>
+                      </a:r>
+                      <a:r>
+                        <a:rPr lang="en-US" sz="1300" dirty="0"/>
+                        <a:t> fixed</a:t>
                       </a:r>
                     </a:p>
                   </a:txBody>
@@ -14466,6 +14474,247 @@
                 <a:extLst>
                   <a:ext uri="{0D108BD9-81ED-4DB2-BD59-A6C34878D82A}">
                     <a16:rowId xmlns:a16="http://schemas.microsoft.com/office/drawing/2014/main" val="2436716201"/>
+                  </a:ext>
+                </a:extLst>
+              </a:tr>
+              <a:tr h="894610">
+                <a:tc>
+                  <a:txBody>
+                    <a:bodyPr/>
+                    <a:lstStyle/>
+                    <a:p>
+                      <a:pPr marL="0" marR="0" lvl="0" indent="0" algn="l" defTabSz="914400" rtl="0" eaLnBrk="1" fontAlgn="auto" latinLnBrk="0" hangingPunct="1">
+                        <a:lnSpc>
+                          <a:spcPct val="100000"/>
+                        </a:lnSpc>
+                        <a:spcBef>
+                          <a:spcPts val="0"/>
+                        </a:spcBef>
+                        <a:spcAft>
+                          <a:spcPts val="0"/>
+                        </a:spcAft>
+                        <a:buClrTx/>
+                        <a:buSzTx/>
+                        <a:buFontTx/>
+                        <a:buNone/>
+                        <a:tabLst/>
+                        <a:defRPr/>
+                      </a:pPr>
+                      <a:r>
+                        <a:rPr lang="en-US" sz="1300" dirty="0"/>
+                        <a:t>Model1960_01a_srva</a:t>
+                      </a:r>
+                    </a:p>
+                    <a:p>
+                      <a:endParaRPr lang="en-US" sz="1300" dirty="0"/>
+                    </a:p>
+                  </a:txBody>
+                  <a:tcPr/>
+                </a:tc>
+                <a:tc>
+                  <a:txBody>
+                    <a:bodyPr/>
+                    <a:lstStyle/>
+                    <a:p>
+                      <a:r>
+                        <a:rPr lang="en-US" sz="1300"/>
+                        <a:t>1960</a:t>
+                      </a:r>
+                      <a:endParaRPr lang="en-US" sz="1300" dirty="0"/>
+                    </a:p>
+                  </a:txBody>
+                  <a:tcPr/>
+                </a:tc>
+                <a:tc>
+                  <a:txBody>
+                    <a:bodyPr/>
+                    <a:lstStyle/>
+                    <a:p>
+                      <a:r>
+                        <a:rPr lang="en-US" sz="1300" dirty="0"/>
+                        <a:t>Initial = Equilibrium, </a:t>
+                      </a:r>
+                    </a:p>
+                    <a:p>
+                      <a:r>
+                        <a:rPr lang="en-US" sz="1300" dirty="0"/>
+                        <a:t>Recruitment (Mean) = regional rec </a:t>
+                      </a:r>
+                      <a:r>
+                        <a:rPr lang="en-US" sz="1300" dirty="0" err="1"/>
+                        <a:t>devs</a:t>
+                      </a:r>
+                      <a:r>
+                        <a:rPr lang="en-US" sz="1300" dirty="0"/>
+                        <a:t>, regional R0 (sum to zero)</a:t>
+                      </a:r>
+                    </a:p>
+                  </a:txBody>
+                  <a:tcPr/>
+                </a:tc>
+                <a:tc>
+                  <a:txBody>
+                    <a:bodyPr/>
+                    <a:lstStyle/>
+                    <a:p>
+                      <a:pPr marL="0" marR="0" lvl="0" indent="0" algn="l" defTabSz="914400" rtl="0" eaLnBrk="1" fontAlgn="auto" latinLnBrk="0" hangingPunct="1">
+                        <a:lnSpc>
+                          <a:spcPct val="100000"/>
+                        </a:lnSpc>
+                        <a:spcBef>
+                          <a:spcPts val="0"/>
+                        </a:spcBef>
+                        <a:spcAft>
+                          <a:spcPts val="0"/>
+                        </a:spcAft>
+                        <a:buClrTx/>
+                        <a:buSzTx/>
+                        <a:buFontTx/>
+                        <a:buNone/>
+                        <a:tabLst/>
+                        <a:defRPr/>
+                      </a:pPr>
+                      <a:r>
+                        <a:rPr lang="en-US" sz="1300" dirty="0" err="1"/>
+                        <a:t>Sel</a:t>
+                      </a:r>
+                      <a:r>
+                        <a:rPr lang="en-US" sz="1300" dirty="0"/>
+                        <a:t> = 2 Blocks</a:t>
+                      </a:r>
+                    </a:p>
+                    <a:p>
+                      <a:pPr marL="0" marR="0" lvl="0" indent="0" algn="l" defTabSz="914400" rtl="0" eaLnBrk="1" fontAlgn="auto" latinLnBrk="0" hangingPunct="1">
+                        <a:lnSpc>
+                          <a:spcPct val="100000"/>
+                        </a:lnSpc>
+                        <a:spcBef>
+                          <a:spcPts val="0"/>
+                        </a:spcBef>
+                        <a:spcAft>
+                          <a:spcPts val="0"/>
+                        </a:spcAft>
+                        <a:buClrTx/>
+                        <a:buSzTx/>
+                        <a:buFontTx/>
+                        <a:buNone/>
+                        <a:tabLst/>
+                        <a:defRPr/>
+                      </a:pPr>
+                      <a:r>
+                        <a:rPr lang="en-US" sz="1300" dirty="0"/>
+                        <a:t>Trawl fix second parameter</a:t>
+                      </a:r>
+                    </a:p>
+                  </a:txBody>
+                  <a:tcPr/>
+                </a:tc>
+                <a:tc>
+                  <a:txBody>
+                    <a:bodyPr/>
+                    <a:lstStyle/>
+                    <a:p>
+                      <a:pPr marL="0" marR="0" lvl="0" indent="0" algn="l" defTabSz="914400" rtl="0" eaLnBrk="1" fontAlgn="auto" latinLnBrk="0" hangingPunct="1">
+                        <a:lnSpc>
+                          <a:spcPct val="100000"/>
+                        </a:lnSpc>
+                        <a:spcBef>
+                          <a:spcPts val="0"/>
+                        </a:spcBef>
+                        <a:spcAft>
+                          <a:spcPts val="0"/>
+                        </a:spcAft>
+                        <a:buClrTx/>
+                        <a:buSzTx/>
+                        <a:buFontTx/>
+                        <a:buNone/>
+                        <a:tabLst/>
+                        <a:defRPr/>
+                      </a:pPr>
+                      <a:r>
+                        <a:rPr lang="en-US" sz="1300" dirty="0" err="1"/>
+                        <a:t>Sel</a:t>
+                      </a:r>
+                      <a:r>
+                        <a:rPr lang="en-US" sz="1300" dirty="0"/>
+                        <a:t> and q = no blocks</a:t>
+                      </a:r>
+                    </a:p>
+                  </a:txBody>
+                  <a:tcPr/>
+                </a:tc>
+                <a:tc>
+                  <a:txBody>
+                    <a:bodyPr/>
+                    <a:lstStyle/>
+                    <a:p>
+                      <a:pPr marL="0" marR="0" lvl="0" indent="0" algn="l" defTabSz="914400" rtl="0" eaLnBrk="1" fontAlgn="auto" latinLnBrk="0" hangingPunct="1">
+                        <a:lnSpc>
+                          <a:spcPct val="100000"/>
+                        </a:lnSpc>
+                        <a:spcBef>
+                          <a:spcPts val="0"/>
+                        </a:spcBef>
+                        <a:spcAft>
+                          <a:spcPts val="0"/>
+                        </a:spcAft>
+                        <a:buClrTx/>
+                        <a:buSzTx/>
+                        <a:buFontTx/>
+                        <a:buNone/>
+                        <a:tabLst/>
+                        <a:defRPr/>
+                      </a:pPr>
+                      <a:r>
+                        <a:rPr lang="en-US" sz="1300" dirty="0"/>
+                        <a:t>Y,</a:t>
+                      </a:r>
+                      <a:r>
+                        <a:rPr lang="en-US" sz="1300" baseline="0" dirty="0"/>
+                        <a:t> </a:t>
+                      </a:r>
+                      <a:r>
+                        <a:rPr lang="en-US" sz="1300" baseline="0" dirty="0" err="1"/>
+                        <a:t>NegBin</a:t>
+                      </a:r>
+                      <a:r>
+                        <a:rPr lang="en-US" sz="1300" baseline="0" dirty="0"/>
+                        <a:t>, Constant Tag Rep (space and time)</a:t>
+                      </a:r>
+                      <a:endParaRPr lang="en-US" sz="1300" dirty="0"/>
+                    </a:p>
+                  </a:txBody>
+                  <a:tcPr/>
+                </a:tc>
+                <a:tc>
+                  <a:txBody>
+                    <a:bodyPr/>
+                    <a:lstStyle/>
+                    <a:p>
+                      <a:r>
+                        <a:rPr lang="en-US" sz="1300" dirty="0"/>
+                        <a:t>Estimated</a:t>
+                      </a:r>
+                    </a:p>
+                  </a:txBody>
+                  <a:tcPr/>
+                </a:tc>
+                <a:tc>
+                  <a:txBody>
+                    <a:bodyPr/>
+                    <a:lstStyle/>
+                    <a:p>
+                      <a:r>
+                        <a:rPr lang="en-US" sz="1300" dirty="0"/>
+                        <a:t>Multinomial</a:t>
+                      </a:r>
+                    </a:p>
+                  </a:txBody>
+                  <a:tcPr/>
+                </a:tc>
+                <a:extLst>
+                  <a:ext uri="{0D108BD9-81ED-4DB2-BD59-A6C34878D82A}">
+                    <a16:rowId xmlns:a16="http://schemas.microsoft.com/office/drawing/2014/main" val="3013858928"/>
                   </a:ext>
                 </a:extLst>
               </a:tr>

</xml_diff>